<commit_message>
Update 7261 Presentation 0 - News Frequency.pptx
</commit_message>
<xml_diff>
--- a/7261 Presentation 0 - News Frequency.pptx
+++ b/7261 Presentation 0 - News Frequency.pptx
@@ -12724,8 +12724,8 @@
           </a:p>
         </p:txBody>
       </p:sp>
-      <mc:AlternateContent xmlns:mc="http://schemas.openxmlformats.org/markup-compatibility/2006">
-        <mc:Choice xmlns:a14="http://schemas.microsoft.com/office/drawing/2010/main" Requires="a14">
+      <mc:AlternateContent xmlns:mc="http://schemas.openxmlformats.org/markup-compatibility/2006" xmlns:a14="http://schemas.microsoft.com/office/drawing/2010/main">
+        <mc:Choice Requires="a14">
           <p:sp>
             <p:nvSpPr>
               <p:cNvPr id="13" name="文本框 12">
@@ -12771,13 +12771,7 @@
                         <a:rPr lang="en-US" altLang="zh-CN" sz="2400" b="0" i="0" dirty="0" smtClean="0">
                           <a:latin typeface="Cambria Math" panose="02040503050406030204" pitchFamily="18" charset="0"/>
                         </a:rPr>
-                        <m:t>=</m:t>
-                      </m:r>
-                      <m:r>
-                        <a:rPr lang="en-US" altLang="zh-CN" sz="2400" b="0" i="0" dirty="0" smtClean="0">
-                          <a:latin typeface="Cambria Math" panose="02040503050406030204" pitchFamily="18" charset="0"/>
-                        </a:rPr>
-                        <m:t>1.542169</m:t>
+                        <m:t>=1.542169</m:t>
                       </m:r>
                     </m:oMath>
                   </m:oMathPara>
@@ -12787,7 +12781,7 @@
             </p:txBody>
           </p:sp>
         </mc:Choice>
-        <mc:Fallback>
+        <mc:Fallback xmlns="">
           <p:sp>
             <p:nvSpPr>
               <p:cNvPr id="13" name="文本框 12">
@@ -13594,8 +13588,8 @@
           </a:p>
         </p:txBody>
       </p:sp>
-      <mc:AlternateContent xmlns:mc="http://schemas.openxmlformats.org/markup-compatibility/2006">
-        <mc:Choice xmlns:a14="http://schemas.microsoft.com/office/drawing/2010/main" Requires="a14">
+      <mc:AlternateContent xmlns:mc="http://schemas.openxmlformats.org/markup-compatibility/2006" xmlns:a14="http://schemas.microsoft.com/office/drawing/2010/main">
+        <mc:Choice Requires="a14">
           <p:sp>
             <p:nvSpPr>
               <p:cNvPr id="4" name="内容占位符 3">
@@ -14658,13 +14652,7 @@
                               <a:rPr lang="en-US" altLang="zh-CN" i="1" dirty="0">
                                 <a:latin typeface="Cambria Math" panose="02040503050406030204" pitchFamily="18" charset="0"/>
                               </a:rPr>
-                              <m:t>−</m:t>
-                            </m:r>
-                            <m:r>
-                              <a:rPr lang="en-US" altLang="zh-CN" i="1" dirty="0">
-                                <a:latin typeface="Cambria Math" panose="02040503050406030204" pitchFamily="18" charset="0"/>
-                              </a:rPr>
-                              <m:t>1.542169</m:t>
+                              <m:t>−1.542169</m:t>
                             </m:r>
                           </m:sup>
                         </m:sSup>
@@ -14760,6 +14748,7 @@
                     </m:r>
                   </m:oMath>
                 </a14:m>
+                <a:endParaRPr lang="en-US" altLang="zh-CN" dirty="0"/>
               </a:p>
               <a:p>
                 <a:endParaRPr lang="en-US" altLang="zh-CN" b="1" dirty="0"/>
@@ -14767,7 +14756,7 @@
             </p:txBody>
           </p:sp>
         </mc:Choice>
-        <mc:Fallback>
+        <mc:Fallback xmlns="">
           <p:sp>
             <p:nvSpPr>
               <p:cNvPr id="4" name="内容占位符 3">
@@ -16030,13 +16019,7 @@
                               <a:rPr lang="en-US" altLang="zh-CN" i="1" dirty="0">
                                 <a:latin typeface="Cambria Math" panose="02040503050406030204" pitchFamily="18" charset="0"/>
                               </a:rPr>
-                              <m:t>−3∗</m:t>
-                            </m:r>
-                            <m:r>
-                              <a:rPr lang="en-US" altLang="zh-CN" i="1" dirty="0">
-                                <a:latin typeface="Cambria Math" panose="02040503050406030204" pitchFamily="18" charset="0"/>
-                              </a:rPr>
-                              <m:t>1.542169</m:t>
+                              <m:t>3∗1.542169</m:t>
                             </m:r>
                           </m:sup>
                         </m:sSup>
@@ -16061,13 +16044,7 @@
                               <a:rPr lang="en-US" altLang="zh-CN" i="1" dirty="0">
                                 <a:latin typeface="Cambria Math" panose="02040503050406030204" pitchFamily="18" charset="0"/>
                               </a:rPr>
-                              <m:t>−</m:t>
-                            </m:r>
-                            <m:r>
-                              <a:rPr lang="en-US" altLang="zh-CN" i="1" dirty="0">
-                                <a:latin typeface="Cambria Math" panose="02040503050406030204" pitchFamily="18" charset="0"/>
-                              </a:rPr>
-                              <m:t>1.542169</m:t>
+                              <m:t>−1.542169</m:t>
                             </m:r>
                           </m:sup>
                         </m:sSup>
@@ -16077,13 +16054,7 @@
                           <a:rPr lang="en-US" altLang="zh-CN" b="0" i="1" dirty="0" smtClean="0">
                             <a:latin typeface="Cambria Math" panose="02040503050406030204" pitchFamily="18" charset="0"/>
                           </a:rPr>
-                          <m:t>(</m:t>
-                        </m:r>
-                        <m:r>
-                          <a:rPr lang="en-US" altLang="zh-CN" b="0" i="1" dirty="0" smtClean="0">
-                            <a:latin typeface="Cambria Math" panose="02040503050406030204" pitchFamily="18" charset="0"/>
-                          </a:rPr>
-                          <m:t>3∗</m:t>
+                          <m:t>(3∗</m:t>
                         </m:r>
                         <m:r>
                           <a:rPr lang="en-US" altLang="zh-CN" i="1" dirty="0">
@@ -16131,6 +16102,7 @@
                     </m:r>
                   </m:oMath>
                 </a14:m>
+                <a:endParaRPr lang="en-US" altLang="zh-CN" dirty="0"/>
               </a:p>
               <a:p>
                 <a:endParaRPr lang="en-US" altLang="zh-CN" b="1" dirty="0"/>
@@ -16340,8 +16312,8 @@
           </a:p>
         </p:txBody>
       </p:sp>
-      <mc:AlternateContent xmlns:mc="http://schemas.openxmlformats.org/markup-compatibility/2006">
-        <mc:Choice xmlns:a14="http://schemas.microsoft.com/office/drawing/2010/main" Requires="a14">
+      <mc:AlternateContent xmlns:mc="http://schemas.openxmlformats.org/markup-compatibility/2006" xmlns:a14="http://schemas.microsoft.com/office/drawing/2010/main">
+        <mc:Choice Requires="a14">
           <p:sp>
             <p:nvSpPr>
               <p:cNvPr id="4" name="内容占位符 3">
@@ -17404,13 +17376,7 @@
                               <a:rPr lang="en-US" altLang="zh-CN" i="1" dirty="0">
                                 <a:latin typeface="Cambria Math" panose="02040503050406030204" pitchFamily="18" charset="0"/>
                               </a:rPr>
-                              <m:t>−</m:t>
-                            </m:r>
-                            <m:r>
-                              <a:rPr lang="en-US" altLang="zh-CN" i="1" dirty="0">
-                                <a:latin typeface="Cambria Math" panose="02040503050406030204" pitchFamily="18" charset="0"/>
-                              </a:rPr>
-                              <m:t>1.542169</m:t>
+                              <m:t>−1.542169</m:t>
                             </m:r>
                           </m:sup>
                         </m:sSup>
@@ -17464,7 +17430,7 @@
                       <a:rPr lang="en-US" altLang="zh-CN" b="1" i="1">
                         <a:latin typeface="Cambria Math" panose="02040503050406030204" pitchFamily="18" charset="0"/>
                       </a:rPr>
-                      <m:t>-</m:t>
+                      <m:t>−</m:t>
                     </m:r>
                     <m:r>
                       <a:rPr lang="en-US" altLang="zh-CN" b="1" i="1">
@@ -17474,6 +17440,7 @@
                     </m:r>
                   </m:oMath>
                 </a14:m>
+                <a:endParaRPr lang="en-US" altLang="zh-CN" dirty="0"/>
               </a:p>
               <a:p>
                 <a:endParaRPr lang="en-US" altLang="zh-CN" b="1" dirty="0"/>
@@ -17484,7 +17451,7 @@
             </p:txBody>
           </p:sp>
         </mc:Choice>
-        <mc:Fallback>
+        <mc:Fallback xmlns="">
           <p:sp>
             <p:nvSpPr>
               <p:cNvPr id="4" name="内容占位符 3">

</xml_diff>